<commit_message>
coisas da agenda python e trabalho do leitor de palavras
</commit_message>
<xml_diff>
--- a/agenda python sql/prototipo.pptx
+++ b/agenda python sql/prototipo.pptx
@@ -6,6 +6,8 @@
   </p:sldMasterIdLst>
   <p:sldIdLst>
     <p:sldId id="256" r:id="rId2"/>
+    <p:sldId id="257" r:id="rId3"/>
+    <p:sldId id="258" r:id="rId4"/>
   </p:sldIdLst>
   <p:sldSz cx="12192000" cy="6858000"/>
   <p:notesSz cx="6858000" cy="9144000"/>
@@ -104,6 +106,11 @@
       </a:defRPr>
     </a:lvl9pPr>
   </p:defaultTextStyle>
+  <p:extLst>
+    <p:ext uri="{EFAFB233-063F-42B5-8137-9DF3F51BA10A}">
+      <p15:sldGuideLst xmlns:p15="http://schemas.microsoft.com/office/powerpoint/2012/main"/>
+    </p:ext>
+  </p:extLst>
 </p:presentation>
 </file>
 
@@ -256,7 +263,7 @@
           <a:p>
             <a:fld id="{DC99C1F1-3E5D-4A08-9618-E5568D3EABCF}" type="datetimeFigureOut">
               <a:rPr lang="pt-BR" smtClean="0"/>
-              <a:t>29/07/2020</a:t>
+              <a:t>07/09/2020</a:t>
             </a:fld>
             <a:endParaRPr lang="pt-BR"/>
           </a:p>
@@ -456,7 +463,7 @@
           <a:p>
             <a:fld id="{DC99C1F1-3E5D-4A08-9618-E5568D3EABCF}" type="datetimeFigureOut">
               <a:rPr lang="pt-BR" smtClean="0"/>
-              <a:t>29/07/2020</a:t>
+              <a:t>07/09/2020</a:t>
             </a:fld>
             <a:endParaRPr lang="pt-BR"/>
           </a:p>
@@ -666,7 +673,7 @@
           <a:p>
             <a:fld id="{DC99C1F1-3E5D-4A08-9618-E5568D3EABCF}" type="datetimeFigureOut">
               <a:rPr lang="pt-BR" smtClean="0"/>
-              <a:t>29/07/2020</a:t>
+              <a:t>07/09/2020</a:t>
             </a:fld>
             <a:endParaRPr lang="pt-BR"/>
           </a:p>
@@ -866,7 +873,7 @@
           <a:p>
             <a:fld id="{DC99C1F1-3E5D-4A08-9618-E5568D3EABCF}" type="datetimeFigureOut">
               <a:rPr lang="pt-BR" smtClean="0"/>
-              <a:t>29/07/2020</a:t>
+              <a:t>07/09/2020</a:t>
             </a:fld>
             <a:endParaRPr lang="pt-BR"/>
           </a:p>
@@ -1142,7 +1149,7 @@
           <a:p>
             <a:fld id="{DC99C1F1-3E5D-4A08-9618-E5568D3EABCF}" type="datetimeFigureOut">
               <a:rPr lang="pt-BR" smtClean="0"/>
-              <a:t>29/07/2020</a:t>
+              <a:t>07/09/2020</a:t>
             </a:fld>
             <a:endParaRPr lang="pt-BR"/>
           </a:p>
@@ -1410,7 +1417,7 @@
           <a:p>
             <a:fld id="{DC99C1F1-3E5D-4A08-9618-E5568D3EABCF}" type="datetimeFigureOut">
               <a:rPr lang="pt-BR" smtClean="0"/>
-              <a:t>29/07/2020</a:t>
+              <a:t>07/09/2020</a:t>
             </a:fld>
             <a:endParaRPr lang="pt-BR"/>
           </a:p>
@@ -1825,7 +1832,7 @@
           <a:p>
             <a:fld id="{DC99C1F1-3E5D-4A08-9618-E5568D3EABCF}" type="datetimeFigureOut">
               <a:rPr lang="pt-BR" smtClean="0"/>
-              <a:t>29/07/2020</a:t>
+              <a:t>07/09/2020</a:t>
             </a:fld>
             <a:endParaRPr lang="pt-BR"/>
           </a:p>
@@ -1967,7 +1974,7 @@
           <a:p>
             <a:fld id="{DC99C1F1-3E5D-4A08-9618-E5568D3EABCF}" type="datetimeFigureOut">
               <a:rPr lang="pt-BR" smtClean="0"/>
-              <a:t>29/07/2020</a:t>
+              <a:t>07/09/2020</a:t>
             </a:fld>
             <a:endParaRPr lang="pt-BR"/>
           </a:p>
@@ -2080,7 +2087,7 @@
           <a:p>
             <a:fld id="{DC99C1F1-3E5D-4A08-9618-E5568D3EABCF}" type="datetimeFigureOut">
               <a:rPr lang="pt-BR" smtClean="0"/>
-              <a:t>29/07/2020</a:t>
+              <a:t>07/09/2020</a:t>
             </a:fld>
             <a:endParaRPr lang="pt-BR"/>
           </a:p>
@@ -2393,7 +2400,7 @@
           <a:p>
             <a:fld id="{DC99C1F1-3E5D-4A08-9618-E5568D3EABCF}" type="datetimeFigureOut">
               <a:rPr lang="pt-BR" smtClean="0"/>
-              <a:t>29/07/2020</a:t>
+              <a:t>07/09/2020</a:t>
             </a:fld>
             <a:endParaRPr lang="pt-BR"/>
           </a:p>
@@ -2682,7 +2689,7 @@
           <a:p>
             <a:fld id="{DC99C1F1-3E5D-4A08-9618-E5568D3EABCF}" type="datetimeFigureOut">
               <a:rPr lang="pt-BR" smtClean="0"/>
-              <a:t>29/07/2020</a:t>
+              <a:t>07/09/2020</a:t>
             </a:fld>
             <a:endParaRPr lang="pt-BR"/>
           </a:p>
@@ -2925,7 +2932,7 @@
           <a:p>
             <a:fld id="{DC99C1F1-3E5D-4A08-9618-E5568D3EABCF}" type="datetimeFigureOut">
               <a:rPr lang="pt-BR" smtClean="0"/>
-              <a:t>29/07/2020</a:t>
+              <a:t>07/09/2020</a:t>
             </a:fld>
             <a:endParaRPr lang="pt-BR"/>
           </a:p>
@@ -3356,8 +3363,167 @@
         </p:nvSpPr>
         <p:spPr>
           <a:xfrm>
-            <a:off x="1944210" y="1118586"/>
-            <a:ext cx="3764132" cy="1393795"/>
+            <a:off x="1226598" y="952130"/>
+            <a:ext cx="9738804" cy="4953740"/>
+          </a:xfrm>
+          <a:prstGeom prst="rect">
+            <a:avLst/>
+          </a:prstGeom>
+          <a:solidFill>
+            <a:schemeClr val="bg2">
+              <a:lumMod val="90000"/>
+            </a:schemeClr>
+          </a:solidFill>
+        </p:spPr>
+        <p:style>
+          <a:lnRef idx="2">
+            <a:schemeClr val="accent1">
+              <a:shade val="50000"/>
+            </a:schemeClr>
+          </a:lnRef>
+          <a:fillRef idx="1">
+            <a:schemeClr val="accent1"/>
+          </a:fillRef>
+          <a:effectRef idx="0">
+            <a:schemeClr val="accent1"/>
+          </a:effectRef>
+          <a:fontRef idx="minor">
+            <a:schemeClr val="lt1"/>
+          </a:fontRef>
+        </p:style>
+        <p:txBody>
+          <a:bodyPr rtlCol="0" anchor="ctr"/>
+          <a:lstStyle/>
+          <a:p>
+            <a:pPr algn="ctr"/>
+            <a:endParaRPr lang="pt-BR"/>
+          </a:p>
+        </p:txBody>
+      </p:sp>
+      <p:sp>
+        <p:nvSpPr>
+          <p:cNvPr id="6" name="Retângulo 5">
+            <a:extLst>
+              <a:ext uri="{FF2B5EF4-FFF2-40B4-BE49-F238E27FC236}">
+                <a16:creationId xmlns:a16="http://schemas.microsoft.com/office/drawing/2014/main" id="{853AC942-AF99-4FCC-B6CD-31C9FE2FD12D}"/>
+              </a:ext>
+            </a:extLst>
+          </p:cNvPr>
+          <p:cNvSpPr/>
+          <p:nvPr/>
+        </p:nvSpPr>
+        <p:spPr>
+          <a:xfrm>
+            <a:off x="3284738" y="334392"/>
+            <a:ext cx="2058140" cy="617738"/>
+          </a:xfrm>
+          <a:prstGeom prst="rect">
+            <a:avLst/>
+          </a:prstGeom>
+          <a:solidFill>
+            <a:schemeClr val="bg2">
+              <a:lumMod val="90000"/>
+            </a:schemeClr>
+          </a:solidFill>
+        </p:spPr>
+        <p:style>
+          <a:lnRef idx="2">
+            <a:schemeClr val="accent1">
+              <a:shade val="50000"/>
+            </a:schemeClr>
+          </a:lnRef>
+          <a:fillRef idx="1">
+            <a:schemeClr val="accent1"/>
+          </a:fillRef>
+          <a:effectRef idx="0">
+            <a:schemeClr val="accent1"/>
+          </a:effectRef>
+          <a:fontRef idx="minor">
+            <a:schemeClr val="lt1"/>
+          </a:fontRef>
+        </p:style>
+        <p:txBody>
+          <a:bodyPr rtlCol="0" anchor="ctr"/>
+          <a:lstStyle/>
+          <a:p>
+            <a:pPr algn="ctr"/>
+            <a:r>
+              <a:rPr lang="pt-BR" dirty="0"/>
+              <a:t>incluir</a:t>
+            </a:r>
+          </a:p>
+        </p:txBody>
+      </p:sp>
+      <p:sp>
+        <p:nvSpPr>
+          <p:cNvPr id="8" name="Retângulo 7">
+            <a:extLst>
+              <a:ext uri="{FF2B5EF4-FFF2-40B4-BE49-F238E27FC236}">
+                <a16:creationId xmlns:a16="http://schemas.microsoft.com/office/drawing/2014/main" id="{FD3835A9-8AF0-44A5-AD32-7F6A2C7C9321}"/>
+              </a:ext>
+            </a:extLst>
+          </p:cNvPr>
+          <p:cNvSpPr/>
+          <p:nvPr/>
+        </p:nvSpPr>
+        <p:spPr>
+          <a:xfrm>
+            <a:off x="5342878" y="334392"/>
+            <a:ext cx="2058140" cy="617738"/>
+          </a:xfrm>
+          <a:prstGeom prst="rect">
+            <a:avLst/>
+          </a:prstGeom>
+          <a:solidFill>
+            <a:schemeClr val="bg2">
+              <a:lumMod val="90000"/>
+            </a:schemeClr>
+          </a:solidFill>
+        </p:spPr>
+        <p:style>
+          <a:lnRef idx="2">
+            <a:schemeClr val="accent1">
+              <a:shade val="50000"/>
+            </a:schemeClr>
+          </a:lnRef>
+          <a:fillRef idx="1">
+            <a:schemeClr val="accent1"/>
+          </a:fillRef>
+          <a:effectRef idx="0">
+            <a:schemeClr val="accent1"/>
+          </a:effectRef>
+          <a:fontRef idx="minor">
+            <a:schemeClr val="lt1"/>
+          </a:fontRef>
+        </p:style>
+        <p:txBody>
+          <a:bodyPr rtlCol="0" anchor="ctr"/>
+          <a:lstStyle/>
+          <a:p>
+            <a:pPr algn="ctr"/>
+            <a:r>
+              <a:rPr lang="pt-BR" dirty="0"/>
+              <a:t>excluir</a:t>
+            </a:r>
+          </a:p>
+        </p:txBody>
+      </p:sp>
+      <p:sp>
+        <p:nvSpPr>
+          <p:cNvPr id="9" name="Retângulo 8">
+            <a:extLst>
+              <a:ext uri="{FF2B5EF4-FFF2-40B4-BE49-F238E27FC236}">
+                <a16:creationId xmlns:a16="http://schemas.microsoft.com/office/drawing/2014/main" id="{6DF67A38-2C38-4CD4-8740-D1B970AA87F1}"/>
+              </a:ext>
+            </a:extLst>
+          </p:cNvPr>
+          <p:cNvSpPr/>
+          <p:nvPr/>
+        </p:nvSpPr>
+        <p:spPr>
+          <a:xfrm>
+            <a:off x="3195961" y="1242874"/>
+            <a:ext cx="4205057" cy="514905"/>
           </a:xfrm>
           <a:prstGeom prst="rect">
             <a:avLst/>
@@ -3384,6 +3550,212 @@
           <a:lstStyle/>
           <a:p>
             <a:pPr algn="ctr"/>
+            <a:r>
+              <a:rPr lang="pt-BR" dirty="0"/>
+              <a:t>pesquisar</a:t>
+            </a:r>
+          </a:p>
+        </p:txBody>
+      </p:sp>
+      <p:sp>
+        <p:nvSpPr>
+          <p:cNvPr id="11" name="Retângulo 10">
+            <a:extLst>
+              <a:ext uri="{FF2B5EF4-FFF2-40B4-BE49-F238E27FC236}">
+                <a16:creationId xmlns:a16="http://schemas.microsoft.com/office/drawing/2014/main" id="{964DE5E7-E96E-4F25-B144-4D6D848C218A}"/>
+              </a:ext>
+            </a:extLst>
+          </p:cNvPr>
+          <p:cNvSpPr/>
+          <p:nvPr/>
+        </p:nvSpPr>
+        <p:spPr>
+          <a:xfrm>
+            <a:off x="7707297" y="1242874"/>
+            <a:ext cx="522303" cy="514905"/>
+          </a:xfrm>
+          <a:prstGeom prst="rect">
+            <a:avLst/>
+          </a:prstGeom>
+        </p:spPr>
+        <p:style>
+          <a:lnRef idx="2">
+            <a:schemeClr val="accent1">
+              <a:shade val="50000"/>
+            </a:schemeClr>
+          </a:lnRef>
+          <a:fillRef idx="1">
+            <a:schemeClr val="accent1"/>
+          </a:fillRef>
+          <a:effectRef idx="0">
+            <a:schemeClr val="accent1"/>
+          </a:effectRef>
+          <a:fontRef idx="minor">
+            <a:schemeClr val="lt1"/>
+          </a:fontRef>
+        </p:style>
+        <p:txBody>
+          <a:bodyPr rtlCol="0" anchor="ctr"/>
+          <a:lstStyle/>
+          <a:p>
+            <a:pPr algn="ctr"/>
+            <a:endParaRPr lang="pt-BR"/>
+          </a:p>
+        </p:txBody>
+      </p:sp>
+      <p:sp>
+        <p:nvSpPr>
+          <p:cNvPr id="13" name="Retângulo 12">
+            <a:extLst>
+              <a:ext uri="{FF2B5EF4-FFF2-40B4-BE49-F238E27FC236}">
+                <a16:creationId xmlns:a16="http://schemas.microsoft.com/office/drawing/2014/main" id="{B3675BF5-E79A-4A35-8B93-ED6A73BB58BD}"/>
+              </a:ext>
+            </a:extLst>
+          </p:cNvPr>
+          <p:cNvSpPr/>
+          <p:nvPr/>
+        </p:nvSpPr>
+        <p:spPr>
+          <a:xfrm>
+            <a:off x="3195960" y="2511270"/>
+            <a:ext cx="5894774" cy="2588952"/>
+          </a:xfrm>
+          <a:prstGeom prst="rect">
+            <a:avLst/>
+          </a:prstGeom>
+        </p:spPr>
+        <p:style>
+          <a:lnRef idx="2">
+            <a:schemeClr val="accent1">
+              <a:shade val="50000"/>
+            </a:schemeClr>
+          </a:lnRef>
+          <a:fillRef idx="1">
+            <a:schemeClr val="accent1"/>
+          </a:fillRef>
+          <a:effectRef idx="0">
+            <a:schemeClr val="accent1"/>
+          </a:effectRef>
+          <a:fontRef idx="minor">
+            <a:schemeClr val="lt1"/>
+          </a:fontRef>
+        </p:style>
+        <p:txBody>
+          <a:bodyPr rtlCol="0" anchor="ctr"/>
+          <a:lstStyle/>
+          <a:p>
+            <a:pPr algn="ctr"/>
+            <a:r>
+              <a:rPr lang="pt-BR" dirty="0"/>
+              <a:t>contato</a:t>
+            </a:r>
+          </a:p>
+        </p:txBody>
+      </p:sp>
+      <p:sp>
+        <p:nvSpPr>
+          <p:cNvPr id="2" name="Retângulo 1">
+            <a:extLst>
+              <a:ext uri="{FF2B5EF4-FFF2-40B4-BE49-F238E27FC236}">
+                <a16:creationId xmlns:a16="http://schemas.microsoft.com/office/drawing/2014/main" id="{EF846A48-660D-40F4-880C-0A57C17FB417}"/>
+              </a:ext>
+            </a:extLst>
+          </p:cNvPr>
+          <p:cNvSpPr/>
+          <p:nvPr/>
+        </p:nvSpPr>
+        <p:spPr>
+          <a:xfrm>
+            <a:off x="1226598" y="334392"/>
+            <a:ext cx="2058140" cy="617738"/>
+          </a:xfrm>
+          <a:prstGeom prst="rect">
+            <a:avLst/>
+          </a:prstGeom>
+          <a:solidFill>
+            <a:schemeClr val="bg2">
+              <a:lumMod val="90000"/>
+            </a:schemeClr>
+          </a:solidFill>
+        </p:spPr>
+        <p:style>
+          <a:lnRef idx="2">
+            <a:schemeClr val="accent1">
+              <a:shade val="50000"/>
+            </a:schemeClr>
+          </a:lnRef>
+          <a:fillRef idx="1">
+            <a:schemeClr val="accent1"/>
+          </a:fillRef>
+          <a:effectRef idx="0">
+            <a:schemeClr val="accent1"/>
+          </a:effectRef>
+          <a:fontRef idx="minor">
+            <a:schemeClr val="lt1"/>
+          </a:fontRef>
+        </p:style>
+        <p:txBody>
+          <a:bodyPr rtlCol="0" anchor="ctr"/>
+          <a:lstStyle/>
+          <a:p>
+            <a:pPr algn="ctr"/>
+            <a:r>
+              <a:rPr lang="pt-BR" dirty="0"/>
+              <a:t>procurar</a:t>
+            </a:r>
+          </a:p>
+        </p:txBody>
+      </p:sp>
+      <p:sp>
+        <p:nvSpPr>
+          <p:cNvPr id="15" name="Retângulo 14">
+            <a:extLst>
+              <a:ext uri="{FF2B5EF4-FFF2-40B4-BE49-F238E27FC236}">
+                <a16:creationId xmlns:a16="http://schemas.microsoft.com/office/drawing/2014/main" id="{EE998FB3-7802-4227-A9F5-F779AF256D2C}"/>
+              </a:ext>
+            </a:extLst>
+          </p:cNvPr>
+          <p:cNvSpPr/>
+          <p:nvPr/>
+        </p:nvSpPr>
+        <p:spPr>
+          <a:xfrm>
+            <a:off x="1226598" y="805093"/>
+            <a:ext cx="2058140" cy="277983"/>
+          </a:xfrm>
+          <a:prstGeom prst="rect">
+            <a:avLst/>
+          </a:prstGeom>
+          <a:solidFill>
+            <a:schemeClr val="bg2">
+              <a:lumMod val="90000"/>
+            </a:schemeClr>
+          </a:solidFill>
+          <a:ln>
+            <a:noFill/>
+          </a:ln>
+        </p:spPr>
+        <p:style>
+          <a:lnRef idx="2">
+            <a:schemeClr val="accent1">
+              <a:shade val="50000"/>
+            </a:schemeClr>
+          </a:lnRef>
+          <a:fillRef idx="1">
+            <a:schemeClr val="accent1"/>
+          </a:fillRef>
+          <a:effectRef idx="0">
+            <a:schemeClr val="accent1"/>
+          </a:effectRef>
+          <a:fontRef idx="minor">
+            <a:schemeClr val="lt1"/>
+          </a:fontRef>
+        </p:style>
+        <p:txBody>
+          <a:bodyPr rtlCol="0" anchor="ctr"/>
+          <a:lstStyle/>
+          <a:p>
+            <a:pPr algn="ctr"/>
             <a:endParaRPr lang="pt-BR"/>
           </a:p>
         </p:txBody>
@@ -3392,6 +3764,1085 @@
     <p:extLst>
       <p:ext uri="{BB962C8B-B14F-4D97-AF65-F5344CB8AC3E}">
         <p14:creationId xmlns:p14="http://schemas.microsoft.com/office/powerpoint/2010/main" val="1830451206"/>
+      </p:ext>
+    </p:extLst>
+  </p:cSld>
+  <p:clrMapOvr>
+    <a:masterClrMapping/>
+  </p:clrMapOvr>
+</p:sld>
+</file>
+
+<file path=ppt/slides/slide2.xml><?xml version="1.0" encoding="utf-8"?>
+<p:sld xmlns:a="http://schemas.openxmlformats.org/drawingml/2006/main" xmlns:r="http://schemas.openxmlformats.org/officeDocument/2006/relationships" xmlns:p="http://schemas.openxmlformats.org/presentationml/2006/main">
+  <p:cSld>
+    <p:spTree>
+      <p:nvGrpSpPr>
+        <p:cNvPr id="1" name=""/>
+        <p:cNvGrpSpPr/>
+        <p:nvPr/>
+      </p:nvGrpSpPr>
+      <p:grpSpPr>
+        <a:xfrm>
+          <a:off x="0" y="0"/>
+          <a:ext cx="0" cy="0"/>
+          <a:chOff x="0" y="0"/>
+          <a:chExt cx="0" cy="0"/>
+        </a:xfrm>
+      </p:grpSpPr>
+      <p:sp>
+        <p:nvSpPr>
+          <p:cNvPr id="4" name="Retângulo 3">
+            <a:extLst>
+              <a:ext uri="{FF2B5EF4-FFF2-40B4-BE49-F238E27FC236}">
+                <a16:creationId xmlns:a16="http://schemas.microsoft.com/office/drawing/2014/main" id="{EC50C77C-712F-40FA-8449-50B43B359F90}"/>
+              </a:ext>
+            </a:extLst>
+          </p:cNvPr>
+          <p:cNvSpPr/>
+          <p:nvPr/>
+        </p:nvSpPr>
+        <p:spPr>
+          <a:xfrm>
+            <a:off x="1226598" y="952130"/>
+            <a:ext cx="9738804" cy="4953740"/>
+          </a:xfrm>
+          <a:prstGeom prst="rect">
+            <a:avLst/>
+          </a:prstGeom>
+          <a:solidFill>
+            <a:schemeClr val="bg2">
+              <a:lumMod val="90000"/>
+            </a:schemeClr>
+          </a:solidFill>
+        </p:spPr>
+        <p:style>
+          <a:lnRef idx="2">
+            <a:schemeClr val="accent1">
+              <a:shade val="50000"/>
+            </a:schemeClr>
+          </a:lnRef>
+          <a:fillRef idx="1">
+            <a:schemeClr val="accent1"/>
+          </a:fillRef>
+          <a:effectRef idx="0">
+            <a:schemeClr val="accent1"/>
+          </a:effectRef>
+          <a:fontRef idx="minor">
+            <a:schemeClr val="lt1"/>
+          </a:fontRef>
+        </p:style>
+        <p:txBody>
+          <a:bodyPr rtlCol="0" anchor="ctr"/>
+          <a:lstStyle/>
+          <a:p>
+            <a:pPr algn="ctr"/>
+            <a:endParaRPr lang="pt-BR"/>
+          </a:p>
+        </p:txBody>
+      </p:sp>
+      <p:sp>
+        <p:nvSpPr>
+          <p:cNvPr id="2" name="Retângulo 1">
+            <a:extLst>
+              <a:ext uri="{FF2B5EF4-FFF2-40B4-BE49-F238E27FC236}">
+                <a16:creationId xmlns:a16="http://schemas.microsoft.com/office/drawing/2014/main" id="{EF846A48-660D-40F4-880C-0A57C17FB417}"/>
+              </a:ext>
+            </a:extLst>
+          </p:cNvPr>
+          <p:cNvSpPr/>
+          <p:nvPr/>
+        </p:nvSpPr>
+        <p:spPr>
+          <a:xfrm>
+            <a:off x="1226598" y="334392"/>
+            <a:ext cx="2058140" cy="617738"/>
+          </a:xfrm>
+          <a:prstGeom prst="rect">
+            <a:avLst/>
+          </a:prstGeom>
+          <a:solidFill>
+            <a:schemeClr val="bg2">
+              <a:lumMod val="90000"/>
+            </a:schemeClr>
+          </a:solidFill>
+        </p:spPr>
+        <p:style>
+          <a:lnRef idx="2">
+            <a:schemeClr val="accent1">
+              <a:shade val="50000"/>
+            </a:schemeClr>
+          </a:lnRef>
+          <a:fillRef idx="1">
+            <a:schemeClr val="accent1"/>
+          </a:fillRef>
+          <a:effectRef idx="0">
+            <a:schemeClr val="accent1"/>
+          </a:effectRef>
+          <a:fontRef idx="minor">
+            <a:schemeClr val="lt1"/>
+          </a:fontRef>
+        </p:style>
+        <p:txBody>
+          <a:bodyPr rtlCol="0" anchor="ctr"/>
+          <a:lstStyle/>
+          <a:p>
+            <a:pPr algn="ctr"/>
+            <a:r>
+              <a:rPr lang="pt-BR" dirty="0"/>
+              <a:t>procurar</a:t>
+            </a:r>
+          </a:p>
+        </p:txBody>
+      </p:sp>
+      <p:sp>
+        <p:nvSpPr>
+          <p:cNvPr id="8" name="Retângulo 7">
+            <a:extLst>
+              <a:ext uri="{FF2B5EF4-FFF2-40B4-BE49-F238E27FC236}">
+                <a16:creationId xmlns:a16="http://schemas.microsoft.com/office/drawing/2014/main" id="{FD3835A9-8AF0-44A5-AD32-7F6A2C7C9321}"/>
+              </a:ext>
+            </a:extLst>
+          </p:cNvPr>
+          <p:cNvSpPr/>
+          <p:nvPr/>
+        </p:nvSpPr>
+        <p:spPr>
+          <a:xfrm>
+            <a:off x="5342878" y="334392"/>
+            <a:ext cx="2058140" cy="617738"/>
+          </a:xfrm>
+          <a:prstGeom prst="rect">
+            <a:avLst/>
+          </a:prstGeom>
+          <a:solidFill>
+            <a:schemeClr val="bg2">
+              <a:lumMod val="90000"/>
+            </a:schemeClr>
+          </a:solidFill>
+        </p:spPr>
+        <p:style>
+          <a:lnRef idx="2">
+            <a:schemeClr val="accent1">
+              <a:shade val="50000"/>
+            </a:schemeClr>
+          </a:lnRef>
+          <a:fillRef idx="1">
+            <a:schemeClr val="accent1"/>
+          </a:fillRef>
+          <a:effectRef idx="0">
+            <a:schemeClr val="accent1"/>
+          </a:effectRef>
+          <a:fontRef idx="minor">
+            <a:schemeClr val="lt1"/>
+          </a:fontRef>
+        </p:style>
+        <p:txBody>
+          <a:bodyPr rtlCol="0" anchor="ctr"/>
+          <a:lstStyle/>
+          <a:p>
+            <a:pPr algn="ctr"/>
+            <a:r>
+              <a:rPr lang="pt-BR" dirty="0"/>
+              <a:t>excluir</a:t>
+            </a:r>
+          </a:p>
+        </p:txBody>
+      </p:sp>
+      <p:sp>
+        <p:nvSpPr>
+          <p:cNvPr id="3" name="Retângulo 2">
+            <a:extLst>
+              <a:ext uri="{FF2B5EF4-FFF2-40B4-BE49-F238E27FC236}">
+                <a16:creationId xmlns:a16="http://schemas.microsoft.com/office/drawing/2014/main" id="{0CF4DEF6-BEEC-4A54-AC39-408378655AA3}"/>
+              </a:ext>
+            </a:extLst>
+          </p:cNvPr>
+          <p:cNvSpPr/>
+          <p:nvPr/>
+        </p:nvSpPr>
+        <p:spPr>
+          <a:xfrm>
+            <a:off x="1544714" y="1216241"/>
+            <a:ext cx="4205057" cy="514905"/>
+          </a:xfrm>
+          <a:prstGeom prst="rect">
+            <a:avLst/>
+          </a:prstGeom>
+        </p:spPr>
+        <p:style>
+          <a:lnRef idx="2">
+            <a:schemeClr val="accent1">
+              <a:shade val="50000"/>
+            </a:schemeClr>
+          </a:lnRef>
+          <a:fillRef idx="1">
+            <a:schemeClr val="accent1"/>
+          </a:fillRef>
+          <a:effectRef idx="0">
+            <a:schemeClr val="accent1"/>
+          </a:effectRef>
+          <a:fontRef idx="minor">
+            <a:schemeClr val="lt1"/>
+          </a:fontRef>
+        </p:style>
+        <p:txBody>
+          <a:bodyPr rtlCol="0" anchor="ctr"/>
+          <a:lstStyle/>
+          <a:p>
+            <a:pPr algn="ctr"/>
+            <a:r>
+              <a:rPr lang="pt-BR" dirty="0"/>
+              <a:t>contato</a:t>
+            </a:r>
+          </a:p>
+        </p:txBody>
+      </p:sp>
+      <p:sp>
+        <p:nvSpPr>
+          <p:cNvPr id="5" name="Retângulo 4">
+            <a:extLst>
+              <a:ext uri="{FF2B5EF4-FFF2-40B4-BE49-F238E27FC236}">
+                <a16:creationId xmlns:a16="http://schemas.microsoft.com/office/drawing/2014/main" id="{21E4FA42-E16A-4064-AC41-3435C7DD4334}"/>
+              </a:ext>
+            </a:extLst>
+          </p:cNvPr>
+          <p:cNvSpPr/>
+          <p:nvPr/>
+        </p:nvSpPr>
+        <p:spPr>
+          <a:xfrm>
+            <a:off x="3148613" y="2348883"/>
+            <a:ext cx="5894774" cy="2675877"/>
+          </a:xfrm>
+          <a:prstGeom prst="rect">
+            <a:avLst/>
+          </a:prstGeom>
+        </p:spPr>
+        <p:style>
+          <a:lnRef idx="2">
+            <a:schemeClr val="accent1">
+              <a:shade val="50000"/>
+            </a:schemeClr>
+          </a:lnRef>
+          <a:fillRef idx="1">
+            <a:schemeClr val="accent1"/>
+          </a:fillRef>
+          <a:effectRef idx="0">
+            <a:schemeClr val="accent1"/>
+          </a:effectRef>
+          <a:fontRef idx="minor">
+            <a:schemeClr val="lt1"/>
+          </a:fontRef>
+        </p:style>
+        <p:txBody>
+          <a:bodyPr rtlCol="0" anchor="ctr"/>
+          <a:lstStyle/>
+          <a:p>
+            <a:pPr algn="ctr"/>
+            <a:endParaRPr lang="pt-BR"/>
+          </a:p>
+        </p:txBody>
+      </p:sp>
+      <p:sp>
+        <p:nvSpPr>
+          <p:cNvPr id="11" name="Retângulo 10">
+            <a:extLst>
+              <a:ext uri="{FF2B5EF4-FFF2-40B4-BE49-F238E27FC236}">
+                <a16:creationId xmlns:a16="http://schemas.microsoft.com/office/drawing/2014/main" id="{1CB650C5-661B-4412-A733-D1E05FC10C48}"/>
+              </a:ext>
+            </a:extLst>
+          </p:cNvPr>
+          <p:cNvSpPr/>
+          <p:nvPr/>
+        </p:nvSpPr>
+        <p:spPr>
+          <a:xfrm>
+            <a:off x="3428259" y="2666262"/>
+            <a:ext cx="5191958" cy="369902"/>
+          </a:xfrm>
+          <a:prstGeom prst="rect">
+            <a:avLst/>
+          </a:prstGeom>
+        </p:spPr>
+        <p:style>
+          <a:lnRef idx="2">
+            <a:schemeClr val="accent1">
+              <a:shade val="50000"/>
+            </a:schemeClr>
+          </a:lnRef>
+          <a:fillRef idx="1">
+            <a:schemeClr val="accent1"/>
+          </a:fillRef>
+          <a:effectRef idx="0">
+            <a:schemeClr val="accent1"/>
+          </a:effectRef>
+          <a:fontRef idx="minor">
+            <a:schemeClr val="lt1"/>
+          </a:fontRef>
+        </p:style>
+        <p:txBody>
+          <a:bodyPr rtlCol="0" anchor="ctr"/>
+          <a:lstStyle/>
+          <a:p>
+            <a:pPr algn="ctr"/>
+            <a:r>
+              <a:rPr lang="pt-BR" dirty="0"/>
+              <a:t>nome</a:t>
+            </a:r>
+          </a:p>
+        </p:txBody>
+      </p:sp>
+      <p:sp>
+        <p:nvSpPr>
+          <p:cNvPr id="13" name="Retângulo 12">
+            <a:extLst>
+              <a:ext uri="{FF2B5EF4-FFF2-40B4-BE49-F238E27FC236}">
+                <a16:creationId xmlns:a16="http://schemas.microsoft.com/office/drawing/2014/main" id="{42979612-BAFD-4CC6-96A2-35E918E1524A}"/>
+              </a:ext>
+            </a:extLst>
+          </p:cNvPr>
+          <p:cNvSpPr/>
+          <p:nvPr/>
+        </p:nvSpPr>
+        <p:spPr>
+          <a:xfrm>
+            <a:off x="3428259" y="3429001"/>
+            <a:ext cx="5191958" cy="369902"/>
+          </a:xfrm>
+          <a:prstGeom prst="rect">
+            <a:avLst/>
+          </a:prstGeom>
+        </p:spPr>
+        <p:style>
+          <a:lnRef idx="2">
+            <a:schemeClr val="accent1">
+              <a:shade val="50000"/>
+            </a:schemeClr>
+          </a:lnRef>
+          <a:fillRef idx="1">
+            <a:schemeClr val="accent1"/>
+          </a:fillRef>
+          <a:effectRef idx="0">
+            <a:schemeClr val="accent1"/>
+          </a:effectRef>
+          <a:fontRef idx="minor">
+            <a:schemeClr val="lt1"/>
+          </a:fontRef>
+        </p:style>
+        <p:txBody>
+          <a:bodyPr rtlCol="0" anchor="ctr"/>
+          <a:lstStyle/>
+          <a:p>
+            <a:pPr algn="ctr"/>
+            <a:r>
+              <a:rPr lang="pt-BR" dirty="0"/>
+              <a:t>telefone</a:t>
+            </a:r>
+          </a:p>
+        </p:txBody>
+      </p:sp>
+      <p:sp>
+        <p:nvSpPr>
+          <p:cNvPr id="15" name="Retângulo 14">
+            <a:extLst>
+              <a:ext uri="{FF2B5EF4-FFF2-40B4-BE49-F238E27FC236}">
+                <a16:creationId xmlns:a16="http://schemas.microsoft.com/office/drawing/2014/main" id="{676CECE8-8BAC-412B-8086-1BCBC90E85A3}"/>
+              </a:ext>
+            </a:extLst>
+          </p:cNvPr>
+          <p:cNvSpPr/>
+          <p:nvPr/>
+        </p:nvSpPr>
+        <p:spPr>
+          <a:xfrm>
+            <a:off x="3428259" y="4152902"/>
+            <a:ext cx="5191958" cy="369902"/>
+          </a:xfrm>
+          <a:prstGeom prst="rect">
+            <a:avLst/>
+          </a:prstGeom>
+        </p:spPr>
+        <p:style>
+          <a:lnRef idx="2">
+            <a:schemeClr val="accent1">
+              <a:shade val="50000"/>
+            </a:schemeClr>
+          </a:lnRef>
+          <a:fillRef idx="1">
+            <a:schemeClr val="accent1"/>
+          </a:fillRef>
+          <a:effectRef idx="0">
+            <a:schemeClr val="accent1"/>
+          </a:effectRef>
+          <a:fontRef idx="minor">
+            <a:schemeClr val="lt1"/>
+          </a:fontRef>
+        </p:style>
+        <p:txBody>
+          <a:bodyPr rtlCol="0" anchor="ctr"/>
+          <a:lstStyle/>
+          <a:p>
+            <a:pPr algn="ctr"/>
+            <a:r>
+              <a:rPr lang="pt-BR" dirty="0" err="1"/>
+              <a:t>email</a:t>
+            </a:r>
+            <a:endParaRPr lang="pt-BR" dirty="0"/>
+          </a:p>
+        </p:txBody>
+      </p:sp>
+      <p:sp>
+        <p:nvSpPr>
+          <p:cNvPr id="17" name="Retângulo 16">
+            <a:extLst>
+              <a:ext uri="{FF2B5EF4-FFF2-40B4-BE49-F238E27FC236}">
+                <a16:creationId xmlns:a16="http://schemas.microsoft.com/office/drawing/2014/main" id="{178B826D-3BF0-4F30-920E-42F3813A10DD}"/>
+              </a:ext>
+            </a:extLst>
+          </p:cNvPr>
+          <p:cNvSpPr/>
+          <p:nvPr/>
+        </p:nvSpPr>
+        <p:spPr>
+          <a:xfrm>
+            <a:off x="5378018" y="5271857"/>
+            <a:ext cx="1435964" cy="369902"/>
+          </a:xfrm>
+          <a:prstGeom prst="rect">
+            <a:avLst/>
+          </a:prstGeom>
+        </p:spPr>
+        <p:style>
+          <a:lnRef idx="2">
+            <a:schemeClr val="accent1">
+              <a:shade val="50000"/>
+            </a:schemeClr>
+          </a:lnRef>
+          <a:fillRef idx="1">
+            <a:schemeClr val="accent1"/>
+          </a:fillRef>
+          <a:effectRef idx="0">
+            <a:schemeClr val="accent1"/>
+          </a:effectRef>
+          <a:fontRef idx="minor">
+            <a:schemeClr val="lt1"/>
+          </a:fontRef>
+        </p:style>
+        <p:txBody>
+          <a:bodyPr rtlCol="0" anchor="ctr"/>
+          <a:lstStyle/>
+          <a:p>
+            <a:pPr algn="ctr"/>
+            <a:r>
+              <a:rPr lang="pt-BR" dirty="0"/>
+              <a:t>incluir</a:t>
+            </a:r>
+          </a:p>
+        </p:txBody>
+      </p:sp>
+      <p:sp>
+        <p:nvSpPr>
+          <p:cNvPr id="6" name="Retângulo 5">
+            <a:extLst>
+              <a:ext uri="{FF2B5EF4-FFF2-40B4-BE49-F238E27FC236}">
+                <a16:creationId xmlns:a16="http://schemas.microsoft.com/office/drawing/2014/main" id="{853AC942-AF99-4FCC-B6CD-31C9FE2FD12D}"/>
+              </a:ext>
+            </a:extLst>
+          </p:cNvPr>
+          <p:cNvSpPr/>
+          <p:nvPr/>
+        </p:nvSpPr>
+        <p:spPr>
+          <a:xfrm>
+            <a:off x="3284738" y="334392"/>
+            <a:ext cx="2058140" cy="617738"/>
+          </a:xfrm>
+          <a:prstGeom prst="rect">
+            <a:avLst/>
+          </a:prstGeom>
+          <a:solidFill>
+            <a:schemeClr val="bg2">
+              <a:lumMod val="90000"/>
+            </a:schemeClr>
+          </a:solidFill>
+        </p:spPr>
+        <p:style>
+          <a:lnRef idx="2">
+            <a:schemeClr val="accent1">
+              <a:shade val="50000"/>
+            </a:schemeClr>
+          </a:lnRef>
+          <a:fillRef idx="1">
+            <a:schemeClr val="accent1"/>
+          </a:fillRef>
+          <a:effectRef idx="0">
+            <a:schemeClr val="accent1"/>
+          </a:effectRef>
+          <a:fontRef idx="minor">
+            <a:schemeClr val="lt1"/>
+          </a:fontRef>
+        </p:style>
+        <p:txBody>
+          <a:bodyPr rtlCol="0" anchor="ctr"/>
+          <a:lstStyle/>
+          <a:p>
+            <a:pPr algn="ctr"/>
+            <a:r>
+              <a:rPr lang="pt-BR" dirty="0"/>
+              <a:t>incluir</a:t>
+            </a:r>
+          </a:p>
+        </p:txBody>
+      </p:sp>
+      <p:sp>
+        <p:nvSpPr>
+          <p:cNvPr id="19" name="Retângulo 18">
+            <a:extLst>
+              <a:ext uri="{FF2B5EF4-FFF2-40B4-BE49-F238E27FC236}">
+                <a16:creationId xmlns:a16="http://schemas.microsoft.com/office/drawing/2014/main" id="{ED4D788C-2CCC-4263-846F-6420F0DCED4D}"/>
+              </a:ext>
+            </a:extLst>
+          </p:cNvPr>
+          <p:cNvSpPr/>
+          <p:nvPr/>
+        </p:nvSpPr>
+        <p:spPr>
+          <a:xfrm>
+            <a:off x="3284738" y="866959"/>
+            <a:ext cx="2058140" cy="277983"/>
+          </a:xfrm>
+          <a:prstGeom prst="rect">
+            <a:avLst/>
+          </a:prstGeom>
+          <a:solidFill>
+            <a:schemeClr val="bg2">
+              <a:lumMod val="90000"/>
+            </a:schemeClr>
+          </a:solidFill>
+          <a:ln>
+            <a:noFill/>
+          </a:ln>
+        </p:spPr>
+        <p:style>
+          <a:lnRef idx="2">
+            <a:schemeClr val="accent1">
+              <a:shade val="50000"/>
+            </a:schemeClr>
+          </a:lnRef>
+          <a:fillRef idx="1">
+            <a:schemeClr val="accent1"/>
+          </a:fillRef>
+          <a:effectRef idx="0">
+            <a:schemeClr val="accent1"/>
+          </a:effectRef>
+          <a:fontRef idx="minor">
+            <a:schemeClr val="lt1"/>
+          </a:fontRef>
+        </p:style>
+        <p:txBody>
+          <a:bodyPr rtlCol="0" anchor="ctr"/>
+          <a:lstStyle/>
+          <a:p>
+            <a:pPr algn="ctr"/>
+            <a:endParaRPr lang="pt-BR"/>
+          </a:p>
+        </p:txBody>
+      </p:sp>
+    </p:spTree>
+    <p:extLst>
+      <p:ext uri="{BB962C8B-B14F-4D97-AF65-F5344CB8AC3E}">
+        <p14:creationId xmlns:p14="http://schemas.microsoft.com/office/powerpoint/2010/main" val="1800148170"/>
+      </p:ext>
+    </p:extLst>
+  </p:cSld>
+  <p:clrMapOvr>
+    <a:masterClrMapping/>
+  </p:clrMapOvr>
+</p:sld>
+</file>
+
+<file path=ppt/slides/slide3.xml><?xml version="1.0" encoding="utf-8"?>
+<p:sld xmlns:a="http://schemas.openxmlformats.org/drawingml/2006/main" xmlns:r="http://schemas.openxmlformats.org/officeDocument/2006/relationships" xmlns:p="http://schemas.openxmlformats.org/presentationml/2006/main">
+  <p:cSld>
+    <p:spTree>
+      <p:nvGrpSpPr>
+        <p:cNvPr id="1" name=""/>
+        <p:cNvGrpSpPr/>
+        <p:nvPr/>
+      </p:nvGrpSpPr>
+      <p:grpSpPr>
+        <a:xfrm>
+          <a:off x="0" y="0"/>
+          <a:ext cx="0" cy="0"/>
+          <a:chOff x="0" y="0"/>
+          <a:chExt cx="0" cy="0"/>
+        </a:xfrm>
+      </p:grpSpPr>
+      <p:sp>
+        <p:nvSpPr>
+          <p:cNvPr id="4" name="Retângulo 3">
+            <a:extLst>
+              <a:ext uri="{FF2B5EF4-FFF2-40B4-BE49-F238E27FC236}">
+                <a16:creationId xmlns:a16="http://schemas.microsoft.com/office/drawing/2014/main" id="{EC50C77C-712F-40FA-8449-50B43B359F90}"/>
+              </a:ext>
+            </a:extLst>
+          </p:cNvPr>
+          <p:cNvSpPr/>
+          <p:nvPr/>
+        </p:nvSpPr>
+        <p:spPr>
+          <a:xfrm>
+            <a:off x="1226598" y="952130"/>
+            <a:ext cx="9738804" cy="4953740"/>
+          </a:xfrm>
+          <a:prstGeom prst="rect">
+            <a:avLst/>
+          </a:prstGeom>
+          <a:solidFill>
+            <a:schemeClr val="bg2">
+              <a:lumMod val="90000"/>
+            </a:schemeClr>
+          </a:solidFill>
+        </p:spPr>
+        <p:style>
+          <a:lnRef idx="2">
+            <a:schemeClr val="accent1">
+              <a:shade val="50000"/>
+            </a:schemeClr>
+          </a:lnRef>
+          <a:fillRef idx="1">
+            <a:schemeClr val="accent1"/>
+          </a:fillRef>
+          <a:effectRef idx="0">
+            <a:schemeClr val="accent1"/>
+          </a:effectRef>
+          <a:fontRef idx="minor">
+            <a:schemeClr val="lt1"/>
+          </a:fontRef>
+        </p:style>
+        <p:txBody>
+          <a:bodyPr rtlCol="0" anchor="ctr"/>
+          <a:lstStyle/>
+          <a:p>
+            <a:pPr algn="ctr"/>
+            <a:endParaRPr lang="pt-BR"/>
+          </a:p>
+        </p:txBody>
+      </p:sp>
+      <p:sp>
+        <p:nvSpPr>
+          <p:cNvPr id="2" name="Retângulo 1">
+            <a:extLst>
+              <a:ext uri="{FF2B5EF4-FFF2-40B4-BE49-F238E27FC236}">
+                <a16:creationId xmlns:a16="http://schemas.microsoft.com/office/drawing/2014/main" id="{EF846A48-660D-40F4-880C-0A57C17FB417}"/>
+              </a:ext>
+            </a:extLst>
+          </p:cNvPr>
+          <p:cNvSpPr/>
+          <p:nvPr/>
+        </p:nvSpPr>
+        <p:spPr>
+          <a:xfrm>
+            <a:off x="1226598" y="334392"/>
+            <a:ext cx="2058140" cy="617738"/>
+          </a:xfrm>
+          <a:prstGeom prst="rect">
+            <a:avLst/>
+          </a:prstGeom>
+          <a:solidFill>
+            <a:schemeClr val="bg2">
+              <a:lumMod val="90000"/>
+            </a:schemeClr>
+          </a:solidFill>
+        </p:spPr>
+        <p:style>
+          <a:lnRef idx="2">
+            <a:schemeClr val="accent1">
+              <a:shade val="50000"/>
+            </a:schemeClr>
+          </a:lnRef>
+          <a:fillRef idx="1">
+            <a:schemeClr val="accent1"/>
+          </a:fillRef>
+          <a:effectRef idx="0">
+            <a:schemeClr val="accent1"/>
+          </a:effectRef>
+          <a:fontRef idx="minor">
+            <a:schemeClr val="lt1"/>
+          </a:fontRef>
+        </p:style>
+        <p:txBody>
+          <a:bodyPr rtlCol="0" anchor="ctr"/>
+          <a:lstStyle/>
+          <a:p>
+            <a:pPr algn="ctr"/>
+            <a:r>
+              <a:rPr lang="pt-BR" dirty="0"/>
+              <a:t>procurar</a:t>
+            </a:r>
+          </a:p>
+        </p:txBody>
+      </p:sp>
+      <p:sp>
+        <p:nvSpPr>
+          <p:cNvPr id="6" name="Retângulo 5">
+            <a:extLst>
+              <a:ext uri="{FF2B5EF4-FFF2-40B4-BE49-F238E27FC236}">
+                <a16:creationId xmlns:a16="http://schemas.microsoft.com/office/drawing/2014/main" id="{853AC942-AF99-4FCC-B6CD-31C9FE2FD12D}"/>
+              </a:ext>
+            </a:extLst>
+          </p:cNvPr>
+          <p:cNvSpPr/>
+          <p:nvPr/>
+        </p:nvSpPr>
+        <p:spPr>
+          <a:xfrm>
+            <a:off x="3284738" y="334392"/>
+            <a:ext cx="2058140" cy="617738"/>
+          </a:xfrm>
+          <a:prstGeom prst="rect">
+            <a:avLst/>
+          </a:prstGeom>
+          <a:solidFill>
+            <a:schemeClr val="bg2">
+              <a:lumMod val="90000"/>
+            </a:schemeClr>
+          </a:solidFill>
+        </p:spPr>
+        <p:style>
+          <a:lnRef idx="2">
+            <a:schemeClr val="accent1">
+              <a:shade val="50000"/>
+            </a:schemeClr>
+          </a:lnRef>
+          <a:fillRef idx="1">
+            <a:schemeClr val="accent1"/>
+          </a:fillRef>
+          <a:effectRef idx="0">
+            <a:schemeClr val="accent1"/>
+          </a:effectRef>
+          <a:fontRef idx="minor">
+            <a:schemeClr val="lt1"/>
+          </a:fontRef>
+        </p:style>
+        <p:txBody>
+          <a:bodyPr rtlCol="0" anchor="ctr"/>
+          <a:lstStyle/>
+          <a:p>
+            <a:pPr algn="ctr"/>
+            <a:r>
+              <a:rPr lang="pt-BR" dirty="0"/>
+              <a:t>incluir</a:t>
+            </a:r>
+          </a:p>
+        </p:txBody>
+      </p:sp>
+      <p:sp>
+        <p:nvSpPr>
+          <p:cNvPr id="9" name="Retângulo 8">
+            <a:extLst>
+              <a:ext uri="{FF2B5EF4-FFF2-40B4-BE49-F238E27FC236}">
+                <a16:creationId xmlns:a16="http://schemas.microsoft.com/office/drawing/2014/main" id="{6DF67A38-2C38-4CD4-8740-D1B970AA87F1}"/>
+              </a:ext>
+            </a:extLst>
+          </p:cNvPr>
+          <p:cNvSpPr/>
+          <p:nvPr/>
+        </p:nvSpPr>
+        <p:spPr>
+          <a:xfrm>
+            <a:off x="3195961" y="1242874"/>
+            <a:ext cx="4205057" cy="514905"/>
+          </a:xfrm>
+          <a:prstGeom prst="rect">
+            <a:avLst/>
+          </a:prstGeom>
+        </p:spPr>
+        <p:style>
+          <a:lnRef idx="2">
+            <a:schemeClr val="accent1">
+              <a:shade val="50000"/>
+            </a:schemeClr>
+          </a:lnRef>
+          <a:fillRef idx="1">
+            <a:schemeClr val="accent1"/>
+          </a:fillRef>
+          <a:effectRef idx="0">
+            <a:schemeClr val="accent1"/>
+          </a:effectRef>
+          <a:fontRef idx="minor">
+            <a:schemeClr val="lt1"/>
+          </a:fontRef>
+        </p:style>
+        <p:txBody>
+          <a:bodyPr rtlCol="0" anchor="ctr"/>
+          <a:lstStyle/>
+          <a:p>
+            <a:pPr algn="ctr"/>
+            <a:r>
+              <a:rPr lang="pt-BR" dirty="0"/>
+              <a:t>pesquisar</a:t>
+            </a:r>
+          </a:p>
+        </p:txBody>
+      </p:sp>
+      <p:sp>
+        <p:nvSpPr>
+          <p:cNvPr id="11" name="Retângulo 10">
+            <a:extLst>
+              <a:ext uri="{FF2B5EF4-FFF2-40B4-BE49-F238E27FC236}">
+                <a16:creationId xmlns:a16="http://schemas.microsoft.com/office/drawing/2014/main" id="{964DE5E7-E96E-4F25-B144-4D6D848C218A}"/>
+              </a:ext>
+            </a:extLst>
+          </p:cNvPr>
+          <p:cNvSpPr/>
+          <p:nvPr/>
+        </p:nvSpPr>
+        <p:spPr>
+          <a:xfrm>
+            <a:off x="7707297" y="1242874"/>
+            <a:ext cx="522303" cy="514905"/>
+          </a:xfrm>
+          <a:prstGeom prst="rect">
+            <a:avLst/>
+          </a:prstGeom>
+        </p:spPr>
+        <p:style>
+          <a:lnRef idx="2">
+            <a:schemeClr val="accent1">
+              <a:shade val="50000"/>
+            </a:schemeClr>
+          </a:lnRef>
+          <a:fillRef idx="1">
+            <a:schemeClr val="accent1"/>
+          </a:fillRef>
+          <a:effectRef idx="0">
+            <a:schemeClr val="accent1"/>
+          </a:effectRef>
+          <a:fontRef idx="minor">
+            <a:schemeClr val="lt1"/>
+          </a:fontRef>
+        </p:style>
+        <p:txBody>
+          <a:bodyPr rtlCol="0" anchor="ctr"/>
+          <a:lstStyle/>
+          <a:p>
+            <a:pPr algn="ctr"/>
+            <a:endParaRPr lang="pt-BR"/>
+          </a:p>
+        </p:txBody>
+      </p:sp>
+      <p:sp>
+        <p:nvSpPr>
+          <p:cNvPr id="13" name="Retângulo 12">
+            <a:extLst>
+              <a:ext uri="{FF2B5EF4-FFF2-40B4-BE49-F238E27FC236}">
+                <a16:creationId xmlns:a16="http://schemas.microsoft.com/office/drawing/2014/main" id="{B3675BF5-E79A-4A35-8B93-ED6A73BB58BD}"/>
+              </a:ext>
+            </a:extLst>
+          </p:cNvPr>
+          <p:cNvSpPr/>
+          <p:nvPr/>
+        </p:nvSpPr>
+        <p:spPr>
+          <a:xfrm>
+            <a:off x="3195960" y="2511270"/>
+            <a:ext cx="5894774" cy="2588952"/>
+          </a:xfrm>
+          <a:prstGeom prst="rect">
+            <a:avLst/>
+          </a:prstGeom>
+        </p:spPr>
+        <p:style>
+          <a:lnRef idx="2">
+            <a:schemeClr val="accent1">
+              <a:shade val="50000"/>
+            </a:schemeClr>
+          </a:lnRef>
+          <a:fillRef idx="1">
+            <a:schemeClr val="accent1"/>
+          </a:fillRef>
+          <a:effectRef idx="0">
+            <a:schemeClr val="accent1"/>
+          </a:effectRef>
+          <a:fontRef idx="minor">
+            <a:schemeClr val="lt1"/>
+          </a:fontRef>
+        </p:style>
+        <p:txBody>
+          <a:bodyPr rtlCol="0" anchor="ctr"/>
+          <a:lstStyle/>
+          <a:p>
+            <a:pPr algn="ctr"/>
+            <a:r>
+              <a:rPr lang="pt-BR" dirty="0"/>
+              <a:t>contato</a:t>
+            </a:r>
+          </a:p>
+        </p:txBody>
+      </p:sp>
+      <p:sp>
+        <p:nvSpPr>
+          <p:cNvPr id="3" name="Retângulo 2">
+            <a:extLst>
+              <a:ext uri="{FF2B5EF4-FFF2-40B4-BE49-F238E27FC236}">
+                <a16:creationId xmlns:a16="http://schemas.microsoft.com/office/drawing/2014/main" id="{3B5BE5C5-78BC-4DE5-A584-BB251996D977}"/>
+              </a:ext>
+            </a:extLst>
+          </p:cNvPr>
+          <p:cNvSpPr/>
+          <p:nvPr/>
+        </p:nvSpPr>
+        <p:spPr>
+          <a:xfrm>
+            <a:off x="9090734" y="5318095"/>
+            <a:ext cx="1435964" cy="369902"/>
+          </a:xfrm>
+          <a:prstGeom prst="rect">
+            <a:avLst/>
+          </a:prstGeom>
+        </p:spPr>
+        <p:style>
+          <a:lnRef idx="2">
+            <a:schemeClr val="accent1">
+              <a:shade val="50000"/>
+            </a:schemeClr>
+          </a:lnRef>
+          <a:fillRef idx="1">
+            <a:schemeClr val="accent1"/>
+          </a:fillRef>
+          <a:effectRef idx="0">
+            <a:schemeClr val="accent1"/>
+          </a:effectRef>
+          <a:fontRef idx="minor">
+            <a:schemeClr val="lt1"/>
+          </a:fontRef>
+        </p:style>
+        <p:txBody>
+          <a:bodyPr rtlCol="0" anchor="ctr"/>
+          <a:lstStyle/>
+          <a:p>
+            <a:pPr algn="ctr"/>
+            <a:r>
+              <a:rPr lang="pt-BR" dirty="0"/>
+              <a:t>excluir</a:t>
+            </a:r>
+          </a:p>
+        </p:txBody>
+      </p:sp>
+      <p:sp>
+        <p:nvSpPr>
+          <p:cNvPr id="8" name="Retângulo 7">
+            <a:extLst>
+              <a:ext uri="{FF2B5EF4-FFF2-40B4-BE49-F238E27FC236}">
+                <a16:creationId xmlns:a16="http://schemas.microsoft.com/office/drawing/2014/main" id="{FD3835A9-8AF0-44A5-AD32-7F6A2C7C9321}"/>
+              </a:ext>
+            </a:extLst>
+          </p:cNvPr>
+          <p:cNvSpPr/>
+          <p:nvPr/>
+        </p:nvSpPr>
+        <p:spPr>
+          <a:xfrm>
+            <a:off x="5342878" y="334392"/>
+            <a:ext cx="2058140" cy="617738"/>
+          </a:xfrm>
+          <a:prstGeom prst="rect">
+            <a:avLst/>
+          </a:prstGeom>
+          <a:solidFill>
+            <a:schemeClr val="bg2">
+              <a:lumMod val="90000"/>
+            </a:schemeClr>
+          </a:solidFill>
+        </p:spPr>
+        <p:style>
+          <a:lnRef idx="2">
+            <a:schemeClr val="accent1">
+              <a:shade val="50000"/>
+            </a:schemeClr>
+          </a:lnRef>
+          <a:fillRef idx="1">
+            <a:schemeClr val="accent1"/>
+          </a:fillRef>
+          <a:effectRef idx="0">
+            <a:schemeClr val="accent1"/>
+          </a:effectRef>
+          <a:fontRef idx="minor">
+            <a:schemeClr val="lt1"/>
+          </a:fontRef>
+        </p:style>
+        <p:txBody>
+          <a:bodyPr rtlCol="0" anchor="ctr"/>
+          <a:lstStyle/>
+          <a:p>
+            <a:pPr algn="ctr"/>
+            <a:r>
+              <a:rPr lang="pt-BR" dirty="0"/>
+              <a:t>excluir</a:t>
+            </a:r>
+          </a:p>
+        </p:txBody>
+      </p:sp>
+      <p:sp>
+        <p:nvSpPr>
+          <p:cNvPr id="5" name="Retângulo 4">
+            <a:extLst>
+              <a:ext uri="{FF2B5EF4-FFF2-40B4-BE49-F238E27FC236}">
+                <a16:creationId xmlns:a16="http://schemas.microsoft.com/office/drawing/2014/main" id="{AB819BCA-F69F-401F-B295-783DC8777B00}"/>
+              </a:ext>
+            </a:extLst>
+          </p:cNvPr>
+          <p:cNvSpPr/>
+          <p:nvPr/>
+        </p:nvSpPr>
+        <p:spPr>
+          <a:xfrm>
+            <a:off x="5342878" y="813138"/>
+            <a:ext cx="2058140" cy="277983"/>
+          </a:xfrm>
+          <a:prstGeom prst="rect">
+            <a:avLst/>
+          </a:prstGeom>
+          <a:solidFill>
+            <a:schemeClr val="bg2">
+              <a:lumMod val="90000"/>
+            </a:schemeClr>
+          </a:solidFill>
+          <a:ln>
+            <a:noFill/>
+          </a:ln>
+        </p:spPr>
+        <p:style>
+          <a:lnRef idx="2">
+            <a:schemeClr val="accent1">
+              <a:shade val="50000"/>
+            </a:schemeClr>
+          </a:lnRef>
+          <a:fillRef idx="1">
+            <a:schemeClr val="accent1"/>
+          </a:fillRef>
+          <a:effectRef idx="0">
+            <a:schemeClr val="accent1"/>
+          </a:effectRef>
+          <a:fontRef idx="minor">
+            <a:schemeClr val="lt1"/>
+          </a:fontRef>
+        </p:style>
+        <p:txBody>
+          <a:bodyPr rtlCol="0" anchor="ctr"/>
+          <a:lstStyle/>
+          <a:p>
+            <a:pPr algn="ctr"/>
+            <a:endParaRPr lang="pt-BR"/>
+          </a:p>
+        </p:txBody>
+      </p:sp>
+    </p:spTree>
+    <p:extLst>
+      <p:ext uri="{BB962C8B-B14F-4D97-AF65-F5344CB8AC3E}">
+        <p14:creationId xmlns:p14="http://schemas.microsoft.com/office/powerpoint/2010/main" val="1662136268"/>
       </p:ext>
     </p:extLst>
   </p:cSld>

</xml_diff>